<commit_message>
Cleaning up CNOT example.
</commit_message>
<xml_diff>
--- a/examples/images/src/cnot-crosstalk-example-on-ankaa-3-topology.pptx
+++ b/examples/images/src/cnot-crosstalk-example-on-ankaa-3-topology.pptx
@@ -259,7 +259,7 @@
           <a:p>
             <a:fld id="{D8547398-7748-1747-B3FA-467A9B8D5B19}" type="datetimeFigureOut">
               <a:rPr lang="en-US" smtClean="0"/>
-              <a:t>5/24/25</a:t>
+              <a:t>5/27/25</a:t>
             </a:fld>
             <a:endParaRPr lang="en-US"/>
           </a:p>
@@ -457,7 +457,7 @@
           <a:p>
             <a:fld id="{D8547398-7748-1747-B3FA-467A9B8D5B19}" type="datetimeFigureOut">
               <a:rPr lang="en-US" smtClean="0"/>
-              <a:t>5/24/25</a:t>
+              <a:t>5/27/25</a:t>
             </a:fld>
             <a:endParaRPr lang="en-US"/>
           </a:p>
@@ -665,7 +665,7 @@
           <a:p>
             <a:fld id="{D8547398-7748-1747-B3FA-467A9B8D5B19}" type="datetimeFigureOut">
               <a:rPr lang="en-US" smtClean="0"/>
-              <a:t>5/24/25</a:t>
+              <a:t>5/27/25</a:t>
             </a:fld>
             <a:endParaRPr lang="en-US"/>
           </a:p>
@@ -863,7 +863,7 @@
           <a:p>
             <a:fld id="{D8547398-7748-1747-B3FA-467A9B8D5B19}" type="datetimeFigureOut">
               <a:rPr lang="en-US" smtClean="0"/>
-              <a:t>5/24/25</a:t>
+              <a:t>5/27/25</a:t>
             </a:fld>
             <a:endParaRPr lang="en-US"/>
           </a:p>
@@ -1138,7 +1138,7 @@
           <a:p>
             <a:fld id="{D8547398-7748-1747-B3FA-467A9B8D5B19}" type="datetimeFigureOut">
               <a:rPr lang="en-US" smtClean="0"/>
-              <a:t>5/24/25</a:t>
+              <a:t>5/27/25</a:t>
             </a:fld>
             <a:endParaRPr lang="en-US"/>
           </a:p>
@@ -1403,7 +1403,7 @@
           <a:p>
             <a:fld id="{D8547398-7748-1747-B3FA-467A9B8D5B19}" type="datetimeFigureOut">
               <a:rPr lang="en-US" smtClean="0"/>
-              <a:t>5/24/25</a:t>
+              <a:t>5/27/25</a:t>
             </a:fld>
             <a:endParaRPr lang="en-US"/>
           </a:p>
@@ -1815,7 +1815,7 @@
           <a:p>
             <a:fld id="{D8547398-7748-1747-B3FA-467A9B8D5B19}" type="datetimeFigureOut">
               <a:rPr lang="en-US" smtClean="0"/>
-              <a:t>5/24/25</a:t>
+              <a:t>5/27/25</a:t>
             </a:fld>
             <a:endParaRPr lang="en-US"/>
           </a:p>
@@ -1956,7 +1956,7 @@
           <a:p>
             <a:fld id="{D8547398-7748-1747-B3FA-467A9B8D5B19}" type="datetimeFigureOut">
               <a:rPr lang="en-US" smtClean="0"/>
-              <a:t>5/24/25</a:t>
+              <a:t>5/27/25</a:t>
             </a:fld>
             <a:endParaRPr lang="en-US"/>
           </a:p>
@@ -2069,7 +2069,7 @@
           <a:p>
             <a:fld id="{D8547398-7748-1747-B3FA-467A9B8D5B19}" type="datetimeFigureOut">
               <a:rPr lang="en-US" smtClean="0"/>
-              <a:t>5/24/25</a:t>
+              <a:t>5/27/25</a:t>
             </a:fld>
             <a:endParaRPr lang="en-US"/>
           </a:p>
@@ -2380,7 +2380,7 @@
           <a:p>
             <a:fld id="{D8547398-7748-1747-B3FA-467A9B8D5B19}" type="datetimeFigureOut">
               <a:rPr lang="en-US" smtClean="0"/>
-              <a:t>5/24/25</a:t>
+              <a:t>5/27/25</a:t>
             </a:fld>
             <a:endParaRPr lang="en-US"/>
           </a:p>
@@ -2668,7 +2668,7 @@
           <a:p>
             <a:fld id="{D8547398-7748-1747-B3FA-467A9B8D5B19}" type="datetimeFigureOut">
               <a:rPr lang="en-US" smtClean="0"/>
-              <a:t>5/24/25</a:t>
+              <a:t>5/27/25</a:t>
             </a:fld>
             <a:endParaRPr lang="en-US"/>
           </a:p>
@@ -2909,7 +2909,7 @@
           <a:p>
             <a:fld id="{D8547398-7748-1747-B3FA-467A9B8D5B19}" type="datetimeFigureOut">
               <a:rPr lang="en-US" smtClean="0"/>
-              <a:t>5/24/25</a:t>
+              <a:t>5/27/25</a:t>
             </a:fld>
             <a:endParaRPr lang="en-US"/>
           </a:p>
@@ -3960,7 +3960,7 @@
             <a:avLst/>
           </a:prstGeom>
           <a:solidFill>
-            <a:srgbClr val="66CBC6"/>
+            <a:schemeClr val="accent2"/>
           </a:solidFill>
           <a:ln w="38100">
             <a:solidFill>
@@ -15007,6 +15007,58 @@
               <a:schemeClr val="accent6">
                 <a:lumMod val="75000"/>
               </a:schemeClr>
+            </a:solidFill>
+          </a:ln>
+        </p:spPr>
+        <p:style>
+          <a:lnRef idx="2">
+            <a:schemeClr val="accent1">
+              <a:shade val="15000"/>
+            </a:schemeClr>
+          </a:lnRef>
+          <a:fillRef idx="1">
+            <a:schemeClr val="accent1"/>
+          </a:fillRef>
+          <a:effectRef idx="0">
+            <a:schemeClr val="accent1"/>
+          </a:effectRef>
+          <a:fontRef idx="minor">
+            <a:schemeClr val="lt1"/>
+          </a:fontRef>
+        </p:style>
+        <p:txBody>
+          <a:bodyPr rtlCol="0" anchor="ctr"/>
+          <a:lstStyle/>
+          <a:p>
+            <a:pPr algn="ctr"/>
+            <a:endParaRPr lang="en-US"/>
+          </a:p>
+        </p:txBody>
+      </p:sp>
+      <p:sp>
+        <p:nvSpPr>
+          <p:cNvPr id="3" name="Oval 2">
+            <a:extLst>
+              <a:ext uri="{FF2B5EF4-FFF2-40B4-BE49-F238E27FC236}">
+                <a16:creationId xmlns:a16="http://schemas.microsoft.com/office/drawing/2014/main" id="{8D2802F0-2837-CA16-4188-9E9BFF20E2BF}"/>
+              </a:ext>
+            </a:extLst>
+          </p:cNvPr>
+          <p:cNvSpPr/>
+          <p:nvPr/>
+        </p:nvSpPr>
+        <p:spPr>
+          <a:xfrm>
+            <a:off x="10642914" y="5798169"/>
+            <a:ext cx="725760" cy="725760"/>
+          </a:xfrm>
+          <a:prstGeom prst="ellipse">
+            <a:avLst/>
+          </a:prstGeom>
+          <a:noFill/>
+          <a:ln w="57150">
+            <a:solidFill>
+              <a:srgbClr val="EA7131"/>
             </a:solidFill>
           </a:ln>
         </p:spPr>

</xml_diff>